<commit_message>
excel and ppt(image spotlight):: by sergio giraldo @ 20230307T1310CET, gpg signed
</commit_message>
<xml_diff>
--- a/powerpoint/ideas6.pptx
+++ b/powerpoint/ideas6.pptx
@@ -111,7 +111,7 @@
   <p:extLst>
     <p:ext uri="{EFAFB233-063F-42B5-8137-9DF3F51BA10A}">
       <p15:sldGuideLst xmlns:p15="http://schemas.microsoft.com/office/powerpoint/2012/main">
-        <p15:guide id="1" orient="horz" pos="1752" userDrawn="1">
+        <p15:guide id="1" orient="horz" pos="1774" userDrawn="1">
           <p15:clr>
             <a:srgbClr val="A4A3A4"/>
           </p15:clr>
@@ -276,7 +276,7 @@
           <a:p>
             <a:fld id="{217A1CAB-3843-D64F-85BB-0D5759D7EE68}" type="datetimeFigureOut">
               <a:rPr lang="en-NL" smtClean="0"/>
-              <a:t>06/03/2023</a:t>
+              <a:t>07/03/2023</a:t>
             </a:fld>
             <a:endParaRPr lang="en-NL"/>
           </a:p>
@@ -476,7 +476,7 @@
           <a:p>
             <a:fld id="{217A1CAB-3843-D64F-85BB-0D5759D7EE68}" type="datetimeFigureOut">
               <a:rPr lang="en-NL" smtClean="0"/>
-              <a:t>06/03/2023</a:t>
+              <a:t>07/03/2023</a:t>
             </a:fld>
             <a:endParaRPr lang="en-NL"/>
           </a:p>
@@ -686,7 +686,7 @@
           <a:p>
             <a:fld id="{217A1CAB-3843-D64F-85BB-0D5759D7EE68}" type="datetimeFigureOut">
               <a:rPr lang="en-NL" smtClean="0"/>
-              <a:t>06/03/2023</a:t>
+              <a:t>07/03/2023</a:t>
             </a:fld>
             <a:endParaRPr lang="en-NL"/>
           </a:p>
@@ -886,7 +886,7 @@
           <a:p>
             <a:fld id="{217A1CAB-3843-D64F-85BB-0D5759D7EE68}" type="datetimeFigureOut">
               <a:rPr lang="en-NL" smtClean="0"/>
-              <a:t>06/03/2023</a:t>
+              <a:t>07/03/2023</a:t>
             </a:fld>
             <a:endParaRPr lang="en-NL"/>
           </a:p>
@@ -1162,7 +1162,7 @@
           <a:p>
             <a:fld id="{217A1CAB-3843-D64F-85BB-0D5759D7EE68}" type="datetimeFigureOut">
               <a:rPr lang="en-NL" smtClean="0"/>
-              <a:t>06/03/2023</a:t>
+              <a:t>07/03/2023</a:t>
             </a:fld>
             <a:endParaRPr lang="en-NL"/>
           </a:p>
@@ -1430,7 +1430,7 @@
           <a:p>
             <a:fld id="{217A1CAB-3843-D64F-85BB-0D5759D7EE68}" type="datetimeFigureOut">
               <a:rPr lang="en-NL" smtClean="0"/>
-              <a:t>06/03/2023</a:t>
+              <a:t>07/03/2023</a:t>
             </a:fld>
             <a:endParaRPr lang="en-NL"/>
           </a:p>
@@ -1845,7 +1845,7 @@
           <a:p>
             <a:fld id="{217A1CAB-3843-D64F-85BB-0D5759D7EE68}" type="datetimeFigureOut">
               <a:rPr lang="en-NL" smtClean="0"/>
-              <a:t>06/03/2023</a:t>
+              <a:t>07/03/2023</a:t>
             </a:fld>
             <a:endParaRPr lang="en-NL"/>
           </a:p>
@@ -1987,7 +1987,7 @@
           <a:p>
             <a:fld id="{217A1CAB-3843-D64F-85BB-0D5759D7EE68}" type="datetimeFigureOut">
               <a:rPr lang="en-NL" smtClean="0"/>
-              <a:t>06/03/2023</a:t>
+              <a:t>07/03/2023</a:t>
             </a:fld>
             <a:endParaRPr lang="en-NL"/>
           </a:p>
@@ -2100,7 +2100,7 @@
           <a:p>
             <a:fld id="{217A1CAB-3843-D64F-85BB-0D5759D7EE68}" type="datetimeFigureOut">
               <a:rPr lang="en-NL" smtClean="0"/>
-              <a:t>06/03/2023</a:t>
+              <a:t>07/03/2023</a:t>
             </a:fld>
             <a:endParaRPr lang="en-NL"/>
           </a:p>
@@ -2413,7 +2413,7 @@
           <a:p>
             <a:fld id="{217A1CAB-3843-D64F-85BB-0D5759D7EE68}" type="datetimeFigureOut">
               <a:rPr lang="en-NL" smtClean="0"/>
-              <a:t>06/03/2023</a:t>
+              <a:t>07/03/2023</a:t>
             </a:fld>
             <a:endParaRPr lang="en-NL"/>
           </a:p>
@@ -2702,7 +2702,7 @@
           <a:p>
             <a:fld id="{217A1CAB-3843-D64F-85BB-0D5759D7EE68}" type="datetimeFigureOut">
               <a:rPr lang="en-NL" smtClean="0"/>
-              <a:t>06/03/2023</a:t>
+              <a:t>07/03/2023</a:t>
             </a:fld>
             <a:endParaRPr lang="en-NL"/>
           </a:p>
@@ -2945,7 +2945,7 @@
           <a:p>
             <a:fld id="{217A1CAB-3843-D64F-85BB-0D5759D7EE68}" type="datetimeFigureOut">
               <a:rPr lang="en-NL" smtClean="0"/>
-              <a:t>06/03/2023</a:t>
+              <a:t>07/03/2023</a:t>
             </a:fld>
             <a:endParaRPr lang="en-NL"/>
           </a:p>
@@ -3637,13 +3637,13 @@
   <p:clrMapOvr>
     <a:masterClrMapping/>
   </p:clrMapOvr>
-  <mc:AlternateContent xmlns:mc="http://schemas.openxmlformats.org/markup-compatibility/2006">
-    <mc:Choice xmlns:p159="http://schemas.microsoft.com/office/powerpoint/2015/09/main" Requires="p159">
+  <mc:AlternateContent xmlns:mc="http://schemas.openxmlformats.org/markup-compatibility/2006" xmlns:p159="http://schemas.microsoft.com/office/powerpoint/2015/09/main">
+    <mc:Choice Requires="p159">
       <p:transition xmlns:p14="http://schemas.microsoft.com/office/powerpoint/2010/main" spd="slow" p14:dur="1250">
         <p159:morph option="byObject"/>
       </p:transition>
     </mc:Choice>
-    <mc:Fallback>
+    <mc:Fallback xmlns="">
       <p:transition spd="slow">
         <p:fade/>
       </p:transition>
@@ -3944,13 +3944,13 @@
   <p:clrMapOvr>
     <a:masterClrMapping/>
   </p:clrMapOvr>
-  <mc:AlternateContent xmlns:mc="http://schemas.openxmlformats.org/markup-compatibility/2006">
-    <mc:Choice xmlns:p159="http://schemas.microsoft.com/office/powerpoint/2015/09/main" Requires="p159">
+  <mc:AlternateContent xmlns:mc="http://schemas.openxmlformats.org/markup-compatibility/2006" xmlns:p159="http://schemas.microsoft.com/office/powerpoint/2015/09/main">
+    <mc:Choice Requires="p159">
       <p:transition xmlns:p14="http://schemas.microsoft.com/office/powerpoint/2010/main" spd="slow" p14:dur="1250" advClick="0" advTm="0">
         <p159:morph option="byObject"/>
       </p:transition>
     </mc:Choice>
-    <mc:Fallback>
+    <mc:Fallback xmlns="">
       <p:transition spd="slow" advClick="0" advTm="0">
         <p:fade/>
       </p:transition>
@@ -4251,13 +4251,13 @@
   <p:clrMapOvr>
     <a:masterClrMapping/>
   </p:clrMapOvr>
-  <mc:AlternateContent xmlns:mc="http://schemas.openxmlformats.org/markup-compatibility/2006">
-    <mc:Choice xmlns:p159="http://schemas.microsoft.com/office/powerpoint/2015/09/main" Requires="p159">
+  <mc:AlternateContent xmlns:mc="http://schemas.openxmlformats.org/markup-compatibility/2006" xmlns:p159="http://schemas.microsoft.com/office/powerpoint/2015/09/main">
+    <mc:Choice Requires="p159">
       <p:transition xmlns:p14="http://schemas.microsoft.com/office/powerpoint/2010/main" spd="slow" p14:dur="1250" advClick="0" advTm="0">
         <p159:morph option="byObject"/>
       </p:transition>
     </mc:Choice>
-    <mc:Fallback>
+    <mc:Fallback xmlns="">
       <p:transition spd="slow" advClick="0" advTm="0">
         <p:fade/>
       </p:transition>
@@ -4558,13 +4558,13 @@
   <p:clrMapOvr>
     <a:masterClrMapping/>
   </p:clrMapOvr>
-  <mc:AlternateContent xmlns:mc="http://schemas.openxmlformats.org/markup-compatibility/2006">
-    <mc:Choice xmlns:p159="http://schemas.microsoft.com/office/powerpoint/2015/09/main" Requires="p159">
+  <mc:AlternateContent xmlns:mc="http://schemas.openxmlformats.org/markup-compatibility/2006" xmlns:p159="http://schemas.microsoft.com/office/powerpoint/2015/09/main">
+    <mc:Choice Requires="p159">
       <p:transition xmlns:p14="http://schemas.microsoft.com/office/powerpoint/2010/main" spd="slow" p14:dur="1250" advClick="0" advTm="0">
         <p159:morph option="byObject"/>
       </p:transition>
     </mc:Choice>
-    <mc:Fallback>
+    <mc:Fallback xmlns="">
       <p:transition spd="slow" advClick="0" advTm="0">
         <p:fade/>
       </p:transition>
@@ -4808,13 +4808,13 @@
   <p:clrMapOvr>
     <a:masterClrMapping/>
   </p:clrMapOvr>
-  <mc:AlternateContent xmlns:mc="http://schemas.openxmlformats.org/markup-compatibility/2006">
-    <mc:Choice xmlns:p159="http://schemas.microsoft.com/office/powerpoint/2015/09/main" Requires="p159">
+  <mc:AlternateContent xmlns:mc="http://schemas.openxmlformats.org/markup-compatibility/2006" xmlns:p159="http://schemas.microsoft.com/office/powerpoint/2015/09/main">
+    <mc:Choice Requires="p159">
       <p:transition xmlns:p14="http://schemas.microsoft.com/office/powerpoint/2010/main" spd="slow" p14:dur="2500" advClick="0">
         <p159:morph option="byObject"/>
       </p:transition>
     </mc:Choice>
-    <mc:Fallback>
+    <mc:Fallback xmlns="">
       <p:transition spd="slow" advClick="0">
         <p:fade/>
       </p:transition>

</xml_diff>